<commit_message>
[ENH] git intro updated to git desktop
</commit_message>
<xml_diff>
--- a/git_intro/intro_to_git_jw.pptx
+++ b/git_intro/intro_to_git_jw.pptx
@@ -4081,7 +4081,7 @@
           <a:p>
             <a:fld id="{B09562B4-2F2B-446B-819C-CF4C31B57AFA}" type="datetimeFigureOut">
               <a:rPr lang="en-US" smtClean="0"/>
-              <a:t>2/15/2022</a:t>
+              <a:t>3/1/2022</a:t>
             </a:fld>
             <a:endParaRPr lang="en-US"/>
           </a:p>
@@ -4281,7 +4281,7 @@
           <a:p>
             <a:fld id="{B09562B4-2F2B-446B-819C-CF4C31B57AFA}" type="datetimeFigureOut">
               <a:rPr lang="en-US" smtClean="0"/>
-              <a:t>2/15/2022</a:t>
+              <a:t>3/1/2022</a:t>
             </a:fld>
             <a:endParaRPr lang="en-US"/>
           </a:p>
@@ -4491,7 +4491,7 @@
           <a:p>
             <a:fld id="{B09562B4-2F2B-446B-819C-CF4C31B57AFA}" type="datetimeFigureOut">
               <a:rPr lang="en-US" smtClean="0"/>
-              <a:t>2/15/2022</a:t>
+              <a:t>3/1/2022</a:t>
             </a:fld>
             <a:endParaRPr lang="en-US"/>
           </a:p>
@@ -6502,7 +6502,7 @@
           <a:p>
             <a:fld id="{B09562B4-2F2B-446B-819C-CF4C31B57AFA}" type="datetimeFigureOut">
               <a:rPr lang="en-US" smtClean="0"/>
-              <a:t>2/15/2022</a:t>
+              <a:t>3/1/2022</a:t>
             </a:fld>
             <a:endParaRPr lang="en-US"/>
           </a:p>
@@ -6770,7 +6770,7 @@
           <a:p>
             <a:fld id="{B09562B4-2F2B-446B-819C-CF4C31B57AFA}" type="datetimeFigureOut">
               <a:rPr lang="en-US" smtClean="0"/>
-              <a:t>2/15/2022</a:t>
+              <a:t>3/1/2022</a:t>
             </a:fld>
             <a:endParaRPr lang="en-US"/>
           </a:p>
@@ -7185,7 +7185,7 @@
           <a:p>
             <a:fld id="{B09562B4-2F2B-446B-819C-CF4C31B57AFA}" type="datetimeFigureOut">
               <a:rPr lang="en-US" smtClean="0"/>
-              <a:t>2/15/2022</a:t>
+              <a:t>3/1/2022</a:t>
             </a:fld>
             <a:endParaRPr lang="en-US"/>
           </a:p>
@@ -7327,7 +7327,7 @@
           <a:p>
             <a:fld id="{B09562B4-2F2B-446B-819C-CF4C31B57AFA}" type="datetimeFigureOut">
               <a:rPr lang="en-US" smtClean="0"/>
-              <a:t>2/15/2022</a:t>
+              <a:t>3/1/2022</a:t>
             </a:fld>
             <a:endParaRPr lang="en-US"/>
           </a:p>
@@ -7440,7 +7440,7 @@
           <a:p>
             <a:fld id="{B09562B4-2F2B-446B-819C-CF4C31B57AFA}" type="datetimeFigureOut">
               <a:rPr lang="en-US" smtClean="0"/>
-              <a:t>2/15/2022</a:t>
+              <a:t>3/1/2022</a:t>
             </a:fld>
             <a:endParaRPr lang="en-US"/>
           </a:p>
@@ -7753,7 +7753,7 @@
           <a:p>
             <a:fld id="{B09562B4-2F2B-446B-819C-CF4C31B57AFA}" type="datetimeFigureOut">
               <a:rPr lang="en-US" smtClean="0"/>
-              <a:t>2/15/2022</a:t>
+              <a:t>3/1/2022</a:t>
             </a:fld>
             <a:endParaRPr lang="en-US"/>
           </a:p>
@@ -7996,7 +7996,7 @@
           <a:p>
             <a:fld id="{B09562B4-2F2B-446B-819C-CF4C31B57AFA}" type="datetimeFigureOut">
               <a:rPr lang="en-US" smtClean="0"/>
-              <a:t>2/15/2022</a:t>
+              <a:t>3/1/2022</a:t>
             </a:fld>
             <a:endParaRPr lang="en-US"/>
           </a:p>
@@ -12100,7 +12100,7 @@
           <a:p>
             <a:r>
               <a:rPr lang="en-US" dirty="0"/>
-              <a:t>GitHub and Atom</a:t>
+              <a:t>GitHub and GitHub Desktop</a:t>
             </a:r>
           </a:p>
           <a:p>

</xml_diff>